<commit_message>
new week new me
</commit_message>
<xml_diff>
--- a/subpages/teaching/expdes/lectures/exp-7.pptx
+++ b/subpages/teaching/expdes/lectures/exp-7.pptx
@@ -5,27 +5,28 @@
     <p:sldMasterId id="2147483648" r:id="rId1"/>
   </p:sldMasterIdLst>
   <p:notesMasterIdLst>
-    <p:notesMasterId r:id="rId20"/>
+    <p:notesMasterId r:id="rId21"/>
   </p:notesMasterIdLst>
   <p:sldIdLst>
     <p:sldId id="256" r:id="rId2"/>
-    <p:sldId id="293" r:id="rId3"/>
-    <p:sldId id="295" r:id="rId4"/>
-    <p:sldId id="296" r:id="rId5"/>
-    <p:sldId id="278" r:id="rId6"/>
-    <p:sldId id="284" r:id="rId7"/>
-    <p:sldId id="259" r:id="rId8"/>
-    <p:sldId id="277" r:id="rId9"/>
-    <p:sldId id="279" r:id="rId10"/>
-    <p:sldId id="280" r:id="rId11"/>
-    <p:sldId id="281" r:id="rId12"/>
-    <p:sldId id="282" r:id="rId13"/>
-    <p:sldId id="285" r:id="rId14"/>
-    <p:sldId id="286" r:id="rId15"/>
-    <p:sldId id="289" r:id="rId16"/>
-    <p:sldId id="290" r:id="rId17"/>
-    <p:sldId id="287" r:id="rId18"/>
-    <p:sldId id="292" r:id="rId19"/>
+    <p:sldId id="297" r:id="rId3"/>
+    <p:sldId id="293" r:id="rId4"/>
+    <p:sldId id="295" r:id="rId5"/>
+    <p:sldId id="296" r:id="rId6"/>
+    <p:sldId id="278" r:id="rId7"/>
+    <p:sldId id="284" r:id="rId8"/>
+    <p:sldId id="259" r:id="rId9"/>
+    <p:sldId id="277" r:id="rId10"/>
+    <p:sldId id="279" r:id="rId11"/>
+    <p:sldId id="280" r:id="rId12"/>
+    <p:sldId id="281" r:id="rId13"/>
+    <p:sldId id="282" r:id="rId14"/>
+    <p:sldId id="285" r:id="rId15"/>
+    <p:sldId id="286" r:id="rId16"/>
+    <p:sldId id="289" r:id="rId17"/>
+    <p:sldId id="290" r:id="rId18"/>
+    <p:sldId id="287" r:id="rId19"/>
+    <p:sldId id="292" r:id="rId20"/>
   </p:sldIdLst>
   <p:sldSz cx="12192000" cy="6858000"/>
   <p:notesSz cx="6858000" cy="9144000"/>
@@ -3488,6 +3489,140 @@
           <a:chExt cx="0" cy="0"/>
         </a:xfrm>
       </p:grpSpPr>
+      <p:sp>
+        <p:nvSpPr>
+          <p:cNvPr id="2" name="Title 1"/>
+          <p:cNvSpPr>
+            <a:spLocks noGrp="1"/>
+          </p:cNvSpPr>
+          <p:nvPr>
+            <p:ph type="title"/>
+          </p:nvPr>
+        </p:nvSpPr>
+        <p:spPr>
+          <a:xfrm>
+            <a:off x="0" y="0"/>
+            <a:ext cx="12192000" cy="935915"/>
+          </a:xfrm>
+          <a:solidFill>
+            <a:schemeClr val="tx1"/>
+          </a:solidFill>
+        </p:spPr>
+        <p:txBody>
+          <a:bodyPr/>
+          <a:lstStyle/>
+          <a:p>
+            <a:pPr algn="ctr"/>
+            <a:r>
+              <a:rPr lang="en-US" b="1" dirty="0">
+                <a:solidFill>
+                  <a:schemeClr val="bg1"/>
+                </a:solidFill>
+              </a:rPr>
+              <a:t>High dimensional data</a:t>
+            </a:r>
+          </a:p>
+        </p:txBody>
+      </p:sp>
+      <p:pic>
+        <p:nvPicPr>
+          <p:cNvPr id="3" name="Picture 2"/>
+          <p:cNvPicPr>
+            <a:picLocks noChangeAspect="1"/>
+          </p:cNvPicPr>
+          <p:nvPr/>
+        </p:nvPicPr>
+        <p:blipFill>
+          <a:blip r:embed="rId2">
+            <a:extLst>
+              <a:ext uri="{28A0092B-C50C-407E-A947-70E740481C1C}">
+                <a14:useLocalDpi xmlns:a14="http://schemas.microsoft.com/office/drawing/2010/main" val="0"/>
+              </a:ext>
+            </a:extLst>
+          </a:blip>
+          <a:stretch>
+            <a:fillRect/>
+          </a:stretch>
+        </p:blipFill>
+        <p:spPr>
+          <a:xfrm>
+            <a:off x="509588" y="1247776"/>
+            <a:ext cx="6629400" cy="5105400"/>
+          </a:xfrm>
+          <a:prstGeom prst="rect">
+            <a:avLst/>
+          </a:prstGeom>
+        </p:spPr>
+      </p:pic>
+      <p:sp>
+        <p:nvSpPr>
+          <p:cNvPr id="5" name="TextBox 4"/>
+          <p:cNvSpPr txBox="1"/>
+          <p:nvPr/>
+        </p:nvSpPr>
+        <p:spPr>
+          <a:xfrm>
+            <a:off x="7843837" y="3215701"/>
+            <a:ext cx="3937809" cy="584775"/>
+          </a:xfrm>
+          <a:prstGeom prst="rect">
+            <a:avLst/>
+          </a:prstGeom>
+          <a:noFill/>
+        </p:spPr>
+        <p:txBody>
+          <a:bodyPr wrap="none" rtlCol="0">
+            <a:spAutoFit/>
+          </a:bodyPr>
+          <a:lstStyle/>
+          <a:p>
+            <a:r>
+              <a:rPr lang="en-US" sz="3200"/>
+              <a:t>What are our options?</a:t>
+            </a:r>
+          </a:p>
+        </p:txBody>
+      </p:sp>
+    </p:spTree>
+    <p:extLst>
+      <p:ext uri="{BB962C8B-B14F-4D97-AF65-F5344CB8AC3E}">
+        <p14:creationId xmlns:p14="http://schemas.microsoft.com/office/powerpoint/2010/main" val="587822369"/>
+      </p:ext>
+    </p:extLst>
+  </p:cSld>
+  <p:clrMapOvr>
+    <a:masterClrMapping/>
+  </p:clrMapOvr>
+</p:sld>
+</file>
+
+<file path=ppt/slides/slide11.xml><?xml version="1.0" encoding="utf-8"?>
+<p:sld xmlns:a="http://schemas.openxmlformats.org/drawingml/2006/main" xmlns:r="http://schemas.openxmlformats.org/officeDocument/2006/relationships" xmlns:p="http://schemas.openxmlformats.org/presentationml/2006/main">
+  <p:cSld>
+    <p:bg>
+      <p:bgPr>
+        <a:solidFill>
+          <a:schemeClr val="bg1">
+            <a:lumMod val="95000"/>
+          </a:schemeClr>
+        </a:solidFill>
+        <a:effectLst/>
+      </p:bgPr>
+    </p:bg>
+    <p:spTree>
+      <p:nvGrpSpPr>
+        <p:cNvPr id="1" name=""/>
+        <p:cNvGrpSpPr/>
+        <p:nvPr/>
+      </p:nvGrpSpPr>
+      <p:grpSpPr>
+        <a:xfrm>
+          <a:off x="0" y="0"/>
+          <a:ext cx="0" cy="0"/>
+          <a:chOff x="0" y="0"/>
+          <a:chExt cx="0" cy="0"/>
+        </a:xfrm>
+      </p:grpSpPr>
       <p:pic>
         <p:nvPicPr>
           <p:cNvPr id="15" name="Picture 14"/>
@@ -3878,7 +4013,7 @@
 </p:sld>
 </file>
 
-<file path=ppt/slides/slide11.xml><?xml version="1.0" encoding="utf-8"?>
+<file path=ppt/slides/slide12.xml><?xml version="1.0" encoding="utf-8"?>
 <p:sld xmlns:a="http://schemas.openxmlformats.org/drawingml/2006/main" xmlns:r="http://schemas.openxmlformats.org/officeDocument/2006/relationships" xmlns:p="http://schemas.openxmlformats.org/presentationml/2006/main">
   <p:cSld>
     <p:bg>
@@ -5163,7 +5298,7 @@
 </p:sld>
 </file>
 
-<file path=ppt/slides/slide12.xml><?xml version="1.0" encoding="utf-8"?>
+<file path=ppt/slides/slide13.xml><?xml version="1.0" encoding="utf-8"?>
 <p:sld xmlns:a="http://schemas.openxmlformats.org/drawingml/2006/main" xmlns:r="http://schemas.openxmlformats.org/officeDocument/2006/relationships" xmlns:p="http://schemas.openxmlformats.org/presentationml/2006/main">
   <p:cSld>
     <p:bg>
@@ -5406,7 +5541,7 @@
 </p:sld>
 </file>
 
-<file path=ppt/slides/slide13.xml><?xml version="1.0" encoding="utf-8"?>
+<file path=ppt/slides/slide14.xml><?xml version="1.0" encoding="utf-8"?>
 <p:sld xmlns:a="http://schemas.openxmlformats.org/drawingml/2006/main" xmlns:r="http://schemas.openxmlformats.org/officeDocument/2006/relationships" xmlns:p="http://schemas.openxmlformats.org/presentationml/2006/main">
   <p:cSld>
     <p:bg>
@@ -5649,7 +5784,7 @@
 </p:sld>
 </file>
 
-<file path=ppt/slides/slide14.xml><?xml version="1.0" encoding="utf-8"?>
+<file path=ppt/slides/slide15.xml><?xml version="1.0" encoding="utf-8"?>
 <p:sld xmlns:a="http://schemas.openxmlformats.org/drawingml/2006/main" xmlns:r="http://schemas.openxmlformats.org/officeDocument/2006/relationships" xmlns:p="http://schemas.openxmlformats.org/presentationml/2006/main">
   <p:cSld>
     <p:bg>
@@ -5801,7 +5936,7 @@
 </p:sld>
 </file>
 
-<file path=ppt/slides/slide15.xml><?xml version="1.0" encoding="utf-8"?>
+<file path=ppt/slides/slide16.xml><?xml version="1.0" encoding="utf-8"?>
 <p:sld xmlns:a="http://schemas.openxmlformats.org/drawingml/2006/main" xmlns:r="http://schemas.openxmlformats.org/officeDocument/2006/relationships" xmlns:p="http://schemas.openxmlformats.org/presentationml/2006/main">
   <p:cSld>
     <p:bg>
@@ -5950,7 +6085,7 @@
 </p:sld>
 </file>
 
-<file path=ppt/slides/slide16.xml><?xml version="1.0" encoding="utf-8"?>
+<file path=ppt/slides/slide17.xml><?xml version="1.0" encoding="utf-8"?>
 <p:sld xmlns:a="http://schemas.openxmlformats.org/drawingml/2006/main" xmlns:r="http://schemas.openxmlformats.org/officeDocument/2006/relationships" xmlns:p="http://schemas.openxmlformats.org/presentationml/2006/main">
   <p:cSld>
     <p:bg>
@@ -6092,7 +6227,7 @@
 </p:sld>
 </file>
 
-<file path=ppt/slides/slide17.xml><?xml version="1.0" encoding="utf-8"?>
+<file path=ppt/slides/slide18.xml><?xml version="1.0" encoding="utf-8"?>
 <p:sld xmlns:a="http://schemas.openxmlformats.org/drawingml/2006/main" xmlns:r="http://schemas.openxmlformats.org/officeDocument/2006/relationships" xmlns:p="http://schemas.openxmlformats.org/presentationml/2006/main">
   <p:cSld>
     <p:spTree>
@@ -6196,7 +6331,7 @@
 </p:sld>
 </file>
 
-<file path=ppt/slides/slide18.xml><?xml version="1.0" encoding="utf-8"?>
+<file path=ppt/slides/slide19.xml><?xml version="1.0" encoding="utf-8"?>
 <p:sld xmlns:a="http://schemas.openxmlformats.org/drawingml/2006/main" xmlns:r="http://schemas.openxmlformats.org/officeDocument/2006/relationships" xmlns:p="http://schemas.openxmlformats.org/presentationml/2006/main">
   <p:cSld>
     <p:bg>
@@ -6386,6 +6521,216 @@
 </file>
 
 <file path=ppt/slides/slide2.xml><?xml version="1.0" encoding="utf-8"?>
+<p:sld xmlns:a="http://schemas.openxmlformats.org/drawingml/2006/main" xmlns:r="http://schemas.openxmlformats.org/officeDocument/2006/relationships" xmlns:p="http://schemas.openxmlformats.org/presentationml/2006/main">
+  <p:cSld>
+    <p:bg>
+      <p:bgPr>
+        <a:solidFill>
+          <a:schemeClr val="bg1">
+            <a:lumMod val="95000"/>
+          </a:schemeClr>
+        </a:solidFill>
+        <a:effectLst/>
+      </p:bgPr>
+    </p:bg>
+    <p:spTree>
+      <p:nvGrpSpPr>
+        <p:cNvPr id="1" name="">
+          <a:extLst>
+            <a:ext uri="{FF2B5EF4-FFF2-40B4-BE49-F238E27FC236}">
+              <a16:creationId xmlns:a16="http://schemas.microsoft.com/office/drawing/2014/main" id="{0DF10374-4C1A-9FEA-AFE1-064975FA0D9F}"/>
+            </a:ext>
+          </a:extLst>
+        </p:cNvPr>
+        <p:cNvGrpSpPr/>
+        <p:nvPr/>
+      </p:nvGrpSpPr>
+      <p:grpSpPr>
+        <a:xfrm>
+          <a:off x="0" y="0"/>
+          <a:ext cx="0" cy="0"/>
+          <a:chOff x="0" y="0"/>
+          <a:chExt cx="0" cy="0"/>
+        </a:xfrm>
+      </p:grpSpPr>
+      <p:sp>
+        <p:nvSpPr>
+          <p:cNvPr id="2" name="Title 1">
+            <a:extLst>
+              <a:ext uri="{FF2B5EF4-FFF2-40B4-BE49-F238E27FC236}">
+                <a16:creationId xmlns:a16="http://schemas.microsoft.com/office/drawing/2014/main" id="{7EE7D562-4125-989B-B9D3-B1EBD40127A1}"/>
+              </a:ext>
+            </a:extLst>
+          </p:cNvPr>
+          <p:cNvSpPr>
+            <a:spLocks noGrp="1"/>
+          </p:cNvSpPr>
+          <p:nvPr>
+            <p:ph type="title"/>
+          </p:nvPr>
+        </p:nvSpPr>
+        <p:spPr>
+          <a:xfrm>
+            <a:off x="0" y="0"/>
+            <a:ext cx="12192000" cy="935915"/>
+          </a:xfrm>
+          <a:solidFill>
+            <a:schemeClr val="tx1"/>
+          </a:solidFill>
+        </p:spPr>
+        <p:txBody>
+          <a:bodyPr/>
+          <a:lstStyle/>
+          <a:p>
+            <a:pPr algn="ctr"/>
+            <a:r>
+              <a:rPr lang="en-US" b="1" dirty="0">
+                <a:solidFill>
+                  <a:schemeClr val="bg1"/>
+                </a:solidFill>
+              </a:rPr>
+              <a:t>Final Exam Ideas</a:t>
+            </a:r>
+          </a:p>
+        </p:txBody>
+      </p:sp>
+      <p:sp>
+        <p:nvSpPr>
+          <p:cNvPr id="4" name="TextBox 3">
+            <a:extLst>
+              <a:ext uri="{FF2B5EF4-FFF2-40B4-BE49-F238E27FC236}">
+                <a16:creationId xmlns:a16="http://schemas.microsoft.com/office/drawing/2014/main" id="{944A5A69-5B63-C4F9-BE88-5E00344D070E}"/>
+              </a:ext>
+            </a:extLst>
+          </p:cNvPr>
+          <p:cNvSpPr txBox="1"/>
+          <p:nvPr/>
+        </p:nvSpPr>
+        <p:spPr>
+          <a:xfrm>
+            <a:off x="279400" y="1092200"/>
+            <a:ext cx="10504863" cy="5262979"/>
+          </a:xfrm>
+          <a:prstGeom prst="rect">
+            <a:avLst/>
+          </a:prstGeom>
+          <a:noFill/>
+        </p:spPr>
+        <p:txBody>
+          <a:bodyPr wrap="none" rtlCol="0">
+            <a:spAutoFit/>
+          </a:bodyPr>
+          <a:lstStyle/>
+          <a:p>
+            <a:r>
+              <a:rPr lang="en-US" sz="2800" dirty="0"/>
+              <a:t>You perform an analysis and visualization of the dataset of your choice.</a:t>
+            </a:r>
+          </a:p>
+          <a:p>
+            <a:pPr marL="285750" indent="-285750">
+              <a:buFont typeface="Arial" panose="020B0604020202020204" pitchFamily="34" charset="0"/>
+              <a:buChar char="•"/>
+            </a:pPr>
+            <a:r>
+              <a:rPr lang="en-US" sz="2800" dirty="0"/>
+              <a:t>Could be yours could be one I provide</a:t>
+            </a:r>
+          </a:p>
+          <a:p>
+            <a:r>
+              <a:rPr lang="en-US" sz="2800" dirty="0"/>
+              <a:t>I would give a structured expectation</a:t>
+            </a:r>
+          </a:p>
+          <a:p>
+            <a:pPr marL="285750" indent="-285750">
+              <a:buFont typeface="Arial" panose="020B0604020202020204" pitchFamily="34" charset="0"/>
+              <a:buChar char="•"/>
+            </a:pPr>
+            <a:r>
+              <a:rPr lang="en-US" sz="2800" dirty="0"/>
+              <a:t>Q1 What is the central hypothesis you will test</a:t>
+            </a:r>
+          </a:p>
+          <a:p>
+            <a:pPr marL="285750" indent="-285750">
+              <a:buFont typeface="Arial" panose="020B0604020202020204" pitchFamily="34" charset="0"/>
+              <a:buChar char="•"/>
+            </a:pPr>
+            <a:r>
+              <a:rPr lang="en-US" sz="2800" dirty="0"/>
+              <a:t>Q2 What test will you use and why</a:t>
+            </a:r>
+          </a:p>
+          <a:p>
+            <a:pPr marL="285750" indent="-285750">
+              <a:buFont typeface="Arial" panose="020B0604020202020204" pitchFamily="34" charset="0"/>
+              <a:buChar char="•"/>
+            </a:pPr>
+            <a:r>
+              <a:rPr lang="en-US" sz="2800" dirty="0"/>
+              <a:t>Q3 What was your result</a:t>
+            </a:r>
+          </a:p>
+          <a:p>
+            <a:pPr marL="285750" indent="-285750">
+              <a:buFont typeface="Arial" panose="020B0604020202020204" pitchFamily="34" charset="0"/>
+              <a:buChar char="•"/>
+            </a:pPr>
+            <a:r>
+              <a:rPr lang="en-US" sz="2800" dirty="0"/>
+              <a:t>Q4 What do you infer</a:t>
+            </a:r>
+          </a:p>
+          <a:p>
+            <a:pPr marL="285750" indent="-285750">
+              <a:buFont typeface="Arial" panose="020B0604020202020204" pitchFamily="34" charset="0"/>
+              <a:buChar char="•"/>
+            </a:pPr>
+            <a:r>
+              <a:rPr lang="en-US" sz="2800" dirty="0"/>
+              <a:t>Q5 Publication quality plot that supports inference</a:t>
+            </a:r>
+          </a:p>
+          <a:p>
+            <a:pPr marL="285750" indent="-285750">
+              <a:buFont typeface="Arial" panose="020B0604020202020204" pitchFamily="34" charset="0"/>
+              <a:buChar char="•"/>
+            </a:pPr>
+            <a:endParaRPr lang="en-US" sz="2800" dirty="0"/>
+          </a:p>
+          <a:p>
+            <a:r>
+              <a:rPr lang="en-US" sz="2800" dirty="0"/>
+              <a:t>Take home exam not in class</a:t>
+            </a:r>
+          </a:p>
+          <a:p>
+            <a:endParaRPr lang="en-US" sz="2800" dirty="0"/>
+          </a:p>
+          <a:p>
+            <a:r>
+              <a:rPr lang="en-US" sz="2800" dirty="0"/>
+              <a:t>AI?</a:t>
+            </a:r>
+          </a:p>
+        </p:txBody>
+      </p:sp>
+    </p:spTree>
+    <p:extLst>
+      <p:ext uri="{BB962C8B-B14F-4D97-AF65-F5344CB8AC3E}">
+        <p14:creationId xmlns:p14="http://schemas.microsoft.com/office/powerpoint/2010/main" val="3788753890"/>
+      </p:ext>
+    </p:extLst>
+  </p:cSld>
+  <p:clrMapOvr>
+    <a:masterClrMapping/>
+  </p:clrMapOvr>
+</p:sld>
+</file>
+
+<file path=ppt/slides/slide3.xml><?xml version="1.0" encoding="utf-8"?>
 <p:sld xmlns:a="http://schemas.openxmlformats.org/drawingml/2006/main" xmlns:r="http://schemas.openxmlformats.org/officeDocument/2006/relationships" xmlns:p="http://schemas.openxmlformats.org/presentationml/2006/main">
   <p:cSld>
     <p:bg>
@@ -7361,7 +7706,7 @@
 </p:sld>
 </file>
 
-<file path=ppt/slides/slide3.xml><?xml version="1.0" encoding="utf-8"?>
+<file path=ppt/slides/slide4.xml><?xml version="1.0" encoding="utf-8"?>
 <p:sld xmlns:a="http://schemas.openxmlformats.org/drawingml/2006/main" xmlns:r="http://schemas.openxmlformats.org/officeDocument/2006/relationships" xmlns:p="http://schemas.openxmlformats.org/presentationml/2006/main">
   <p:cSld>
     <p:bg>
@@ -7650,7 +7995,7 @@
 </p:sld>
 </file>
 
-<file path=ppt/slides/slide4.xml><?xml version="1.0" encoding="utf-8"?>
+<file path=ppt/slides/slide5.xml><?xml version="1.0" encoding="utf-8"?>
 <p:sld xmlns:a="http://schemas.openxmlformats.org/drawingml/2006/main" xmlns:r="http://schemas.openxmlformats.org/officeDocument/2006/relationships" xmlns:p="http://schemas.openxmlformats.org/presentationml/2006/main">
   <p:cSld>
     <p:bg>
@@ -7768,7 +8113,7 @@
 </p:sld>
 </file>
 
-<file path=ppt/slides/slide5.xml><?xml version="1.0" encoding="utf-8"?>
+<file path=ppt/slides/slide6.xml><?xml version="1.0" encoding="utf-8"?>
 <p:sld xmlns:a="http://schemas.openxmlformats.org/drawingml/2006/main" xmlns:r="http://schemas.openxmlformats.org/officeDocument/2006/relationships" xmlns:p="http://schemas.openxmlformats.org/presentationml/2006/main">
   <p:cSld>
     <p:bg>
@@ -8138,7 +8483,7 @@
 </p:sld>
 </file>
 
-<file path=ppt/slides/slide6.xml><?xml version="1.0" encoding="utf-8"?>
+<file path=ppt/slides/slide7.xml><?xml version="1.0" encoding="utf-8"?>
 <p:sld xmlns:a="http://schemas.openxmlformats.org/drawingml/2006/main" xmlns:r="http://schemas.openxmlformats.org/officeDocument/2006/relationships" xmlns:p="http://schemas.openxmlformats.org/presentationml/2006/main">
   <p:cSld>
     <p:bg>
@@ -8249,7 +8594,7 @@
 </p:sld>
 </file>
 
-<file path=ppt/slides/slide7.xml><?xml version="1.0" encoding="utf-8"?>
+<file path=ppt/slides/slide8.xml><?xml version="1.0" encoding="utf-8"?>
 <p:sld xmlns:a="http://schemas.openxmlformats.org/drawingml/2006/main" xmlns:r="http://schemas.openxmlformats.org/officeDocument/2006/relationships" xmlns:p="http://schemas.openxmlformats.org/presentationml/2006/main">
   <p:cSld>
     <p:bg>
@@ -8384,7 +8729,7 @@
 </p:sld>
 </file>
 
-<file path=ppt/slides/slide8.xml><?xml version="1.0" encoding="utf-8"?>
+<file path=ppt/slides/slide9.xml><?xml version="1.0" encoding="utf-8"?>
 <p:sld xmlns:a="http://schemas.openxmlformats.org/drawingml/2006/main" xmlns:r="http://schemas.openxmlformats.org/officeDocument/2006/relationships" xmlns:p="http://schemas.openxmlformats.org/presentationml/2006/main">
   <p:cSld>
     <p:bg>
@@ -8510,140 +8855,6 @@
     <p:extLst>
       <p:ext uri="{BB962C8B-B14F-4D97-AF65-F5344CB8AC3E}">
         <p14:creationId xmlns:p14="http://schemas.microsoft.com/office/powerpoint/2010/main" val="755446493"/>
-      </p:ext>
-    </p:extLst>
-  </p:cSld>
-  <p:clrMapOvr>
-    <a:masterClrMapping/>
-  </p:clrMapOvr>
-</p:sld>
-</file>
-
-<file path=ppt/slides/slide9.xml><?xml version="1.0" encoding="utf-8"?>
-<p:sld xmlns:a="http://schemas.openxmlformats.org/drawingml/2006/main" xmlns:r="http://schemas.openxmlformats.org/officeDocument/2006/relationships" xmlns:p="http://schemas.openxmlformats.org/presentationml/2006/main">
-  <p:cSld>
-    <p:bg>
-      <p:bgPr>
-        <a:solidFill>
-          <a:schemeClr val="bg1">
-            <a:lumMod val="95000"/>
-          </a:schemeClr>
-        </a:solidFill>
-        <a:effectLst/>
-      </p:bgPr>
-    </p:bg>
-    <p:spTree>
-      <p:nvGrpSpPr>
-        <p:cNvPr id="1" name=""/>
-        <p:cNvGrpSpPr/>
-        <p:nvPr/>
-      </p:nvGrpSpPr>
-      <p:grpSpPr>
-        <a:xfrm>
-          <a:off x="0" y="0"/>
-          <a:ext cx="0" cy="0"/>
-          <a:chOff x="0" y="0"/>
-          <a:chExt cx="0" cy="0"/>
-        </a:xfrm>
-      </p:grpSpPr>
-      <p:sp>
-        <p:nvSpPr>
-          <p:cNvPr id="2" name="Title 1"/>
-          <p:cNvSpPr>
-            <a:spLocks noGrp="1"/>
-          </p:cNvSpPr>
-          <p:nvPr>
-            <p:ph type="title"/>
-          </p:nvPr>
-        </p:nvSpPr>
-        <p:spPr>
-          <a:xfrm>
-            <a:off x="0" y="0"/>
-            <a:ext cx="12192000" cy="935915"/>
-          </a:xfrm>
-          <a:solidFill>
-            <a:schemeClr val="tx1"/>
-          </a:solidFill>
-        </p:spPr>
-        <p:txBody>
-          <a:bodyPr/>
-          <a:lstStyle/>
-          <a:p>
-            <a:pPr algn="ctr"/>
-            <a:r>
-              <a:rPr lang="en-US" b="1" dirty="0">
-                <a:solidFill>
-                  <a:schemeClr val="bg1"/>
-                </a:solidFill>
-              </a:rPr>
-              <a:t>High dimensional data</a:t>
-            </a:r>
-          </a:p>
-        </p:txBody>
-      </p:sp>
-      <p:pic>
-        <p:nvPicPr>
-          <p:cNvPr id="3" name="Picture 2"/>
-          <p:cNvPicPr>
-            <a:picLocks noChangeAspect="1"/>
-          </p:cNvPicPr>
-          <p:nvPr/>
-        </p:nvPicPr>
-        <p:blipFill>
-          <a:blip r:embed="rId2">
-            <a:extLst>
-              <a:ext uri="{28A0092B-C50C-407E-A947-70E740481C1C}">
-                <a14:useLocalDpi xmlns:a14="http://schemas.microsoft.com/office/drawing/2010/main" val="0"/>
-              </a:ext>
-            </a:extLst>
-          </a:blip>
-          <a:stretch>
-            <a:fillRect/>
-          </a:stretch>
-        </p:blipFill>
-        <p:spPr>
-          <a:xfrm>
-            <a:off x="509588" y="1247776"/>
-            <a:ext cx="6629400" cy="5105400"/>
-          </a:xfrm>
-          <a:prstGeom prst="rect">
-            <a:avLst/>
-          </a:prstGeom>
-        </p:spPr>
-      </p:pic>
-      <p:sp>
-        <p:nvSpPr>
-          <p:cNvPr id="5" name="TextBox 4"/>
-          <p:cNvSpPr txBox="1"/>
-          <p:nvPr/>
-        </p:nvSpPr>
-        <p:spPr>
-          <a:xfrm>
-            <a:off x="7843837" y="3215701"/>
-            <a:ext cx="3937809" cy="584775"/>
-          </a:xfrm>
-          <a:prstGeom prst="rect">
-            <a:avLst/>
-          </a:prstGeom>
-          <a:noFill/>
-        </p:spPr>
-        <p:txBody>
-          <a:bodyPr wrap="none" rtlCol="0">
-            <a:spAutoFit/>
-          </a:bodyPr>
-          <a:lstStyle/>
-          <a:p>
-            <a:r>
-              <a:rPr lang="en-US" sz="3200"/>
-              <a:t>What are our options?</a:t>
-            </a:r>
-          </a:p>
-        </p:txBody>
-      </p:sp>
-    </p:spTree>
-    <p:extLst>
-      <p:ext uri="{BB962C8B-B14F-4D97-AF65-F5344CB8AC3E}">
-        <p14:creationId xmlns:p14="http://schemas.microsoft.com/office/powerpoint/2010/main" val="587822369"/>
       </p:ext>
     </p:extLst>
   </p:cSld>

</xml_diff>